<commit_message>
replaced 3d round corner boxes by rectangles to fix pdf export from svg
</commit_message>
<xml_diff>
--- a/poster/SAIM_workflow.pptx
+++ b/poster/SAIM_workflow.pptx
@@ -877,7 +877,13 @@
     </dgm:pt>
     <dgm:pt modelId="{F59A9172-09D6-4C9E-BC24-30C1530FD2C4}">
       <dgm:prSet phldrT="[Text]"/>
-      <dgm:spPr/>
+      <dgm:spPr>
+        <a:scene3d>
+          <a:camera prst="orthographicFront"/>
+          <a:lightRig rig="chilly" dir="t"/>
+        </a:scene3d>
+        <a:sp3d prstMaterial="translucentPowder"/>
+      </dgm:spPr>
       <dgm:t>
         <a:bodyPr/>
         <a:lstStyle/>
@@ -914,7 +920,13 @@
     </dgm:pt>
     <dgm:pt modelId="{8C6BCDEC-DD31-478A-A2E6-A43E8C76D5AA}">
       <dgm:prSet phldrT="[Text]"/>
-      <dgm:spPr/>
+      <dgm:spPr>
+        <a:scene3d>
+          <a:camera prst="orthographicFront"/>
+          <a:lightRig rig="chilly" dir="t"/>
+        </a:scene3d>
+        <a:sp3d prstMaterial="translucentPowder"/>
+      </dgm:spPr>
       <dgm:t>
         <a:bodyPr/>
         <a:lstStyle/>
@@ -951,7 +963,13 @@
     </dgm:pt>
     <dgm:pt modelId="{926090DC-122C-4287-8502-5EE2BD5D754D}">
       <dgm:prSet phldrT="[Text]"/>
-      <dgm:spPr/>
+      <dgm:spPr>
+        <a:scene3d>
+          <a:camera prst="orthographicFront"/>
+          <a:lightRig rig="chilly" dir="t"/>
+        </a:scene3d>
+        <a:sp3d prstMaterial="translucentPowder"/>
+      </dgm:spPr>
       <dgm:t>
         <a:bodyPr/>
         <a:lstStyle/>
@@ -988,7 +1006,13 @@
     </dgm:pt>
     <dgm:pt modelId="{19F22B93-FE62-4406-A620-6D7A8D41A868}">
       <dgm:prSet phldrT="[Text]"/>
-      <dgm:spPr/>
+      <dgm:spPr>
+        <a:scene3d>
+          <a:camera prst="orthographicFront"/>
+          <a:lightRig rig="chilly" dir="t"/>
+        </a:scene3d>
+        <a:sp3d prstMaterial="translucentPowder"/>
+      </dgm:spPr>
       <dgm:t>
         <a:bodyPr/>
         <a:lstStyle/>
@@ -1025,7 +1049,13 @@
     </dgm:pt>
     <dgm:pt modelId="{9F9D9904-AF7E-47B5-9B84-220D08DFA18E}">
       <dgm:prSet phldrT="[Text]"/>
-      <dgm:spPr/>
+      <dgm:spPr>
+        <a:scene3d>
+          <a:camera prst="orthographicFront"/>
+          <a:lightRig rig="chilly" dir="t"/>
+        </a:scene3d>
+        <a:sp3d z="-12700" extrusionH="1700" prstMaterial="dkEdge"/>
+      </dgm:spPr>
       <dgm:t>
         <a:bodyPr/>
         <a:lstStyle/>
@@ -1062,7 +1092,13 @@
     </dgm:pt>
     <dgm:pt modelId="{4A7249EE-B677-41B7-9AAA-20616BCDA6B8}">
       <dgm:prSet phldrT="[Text]"/>
-      <dgm:spPr/>
+      <dgm:spPr>
+        <a:scene3d>
+          <a:camera prst="orthographicFront"/>
+          <a:lightRig rig="chilly" dir="t"/>
+        </a:scene3d>
+        <a:sp3d z="-12700" extrusionH="1700" prstMaterial="dkEdge"/>
+      </dgm:spPr>
       <dgm:t>
         <a:bodyPr/>
         <a:lstStyle/>
@@ -1134,7 +1170,13 @@
     </dgm:pt>
     <dgm:pt modelId="{7F51DA86-0EE0-4FB6-BA83-C852B1C26749}">
       <dgm:prSet phldrT="[Text]"/>
-      <dgm:spPr/>
+      <dgm:spPr>
+        <a:scene3d>
+          <a:camera prst="orthographicFront"/>
+          <a:lightRig rig="chilly" dir="t"/>
+        </a:scene3d>
+        <a:sp3d z="-12700" extrusionH="1700" prstMaterial="dkEdge"/>
+      </dgm:spPr>
       <dgm:t>
         <a:bodyPr/>
         <a:lstStyle/>
@@ -1171,7 +1213,13 @@
     </dgm:pt>
     <dgm:pt modelId="{45B80FCA-E6A3-4EB0-BF83-50A4F2A3F06B}">
       <dgm:prSet phldrT="[Text]"/>
-      <dgm:spPr/>
+      <dgm:spPr>
+        <a:scene3d>
+          <a:camera prst="orthographicFront"/>
+          <a:lightRig rig="chilly" dir="t"/>
+        </a:scene3d>
+        <a:sp3d z="-12700" extrusionH="1700" prstMaterial="dkEdge"/>
+      </dgm:spPr>
       <dgm:t>
         <a:bodyPr/>
         <a:lstStyle/>
@@ -1207,7 +1255,13 @@
     </dgm:pt>
     <dgm:pt modelId="{F5E1A0FD-D6DA-4382-9603-B2B2CE0D0167}">
       <dgm:prSet phldrT="[Text]"/>
-      <dgm:spPr/>
+      <dgm:spPr>
+        <a:scene3d>
+          <a:camera prst="orthographicFront"/>
+          <a:lightRig rig="chilly" dir="t"/>
+        </a:scene3d>
+        <a:sp3d z="-12700" extrusionH="1700" prstMaterial="dkEdge"/>
+      </dgm:spPr>
       <dgm:t>
         <a:bodyPr/>
         <a:lstStyle/>
@@ -1244,7 +1298,13 @@
     </dgm:pt>
     <dgm:pt modelId="{E9C2B921-215B-4F0D-AF75-7D545F0C2A75}">
       <dgm:prSet phldrT="[Text]"/>
-      <dgm:spPr/>
+      <dgm:spPr>
+        <a:scene3d>
+          <a:camera prst="orthographicFront"/>
+          <a:lightRig rig="chilly" dir="t"/>
+        </a:scene3d>
+        <a:sp3d z="-12700" extrusionH="1700" prstMaterial="dkEdge"/>
+      </dgm:spPr>
       <dgm:t>
         <a:bodyPr/>
         <a:lstStyle/>
@@ -1281,7 +1341,13 @@
     </dgm:pt>
     <dgm:pt modelId="{9169A519-1C91-4A33-B74E-836953109DDE}">
       <dgm:prSet phldrT="[Text]"/>
-      <dgm:spPr/>
+      <dgm:spPr>
+        <a:scene3d>
+          <a:camera prst="orthographicFront"/>
+          <a:lightRig rig="chilly" dir="t"/>
+        </a:scene3d>
+        <a:sp3d z="-12700" extrusionH="1700" prstMaterial="dkEdge"/>
+      </dgm:spPr>
       <dgm:t>
         <a:bodyPr/>
         <a:lstStyle/>
@@ -1318,7 +1384,13 @@
     </dgm:pt>
     <dgm:pt modelId="{5B463AC0-AC28-463F-84F3-F56607812315}">
       <dgm:prSet phldrT="[Text]"/>
-      <dgm:spPr/>
+      <dgm:spPr>
+        <a:scene3d>
+          <a:camera prst="orthographicFront"/>
+          <a:lightRig rig="chilly" dir="t"/>
+        </a:scene3d>
+        <a:sp3d z="-12700" extrusionH="1700" prstMaterial="dkEdge"/>
+      </dgm:spPr>
       <dgm:t>
         <a:bodyPr/>
         <a:lstStyle/>
@@ -1354,7 +1426,13 @@
     </dgm:pt>
     <dgm:pt modelId="{C4D54D52-4ADD-4460-B7DB-806528205976}">
       <dgm:prSet phldrT="[Text]"/>
-      <dgm:spPr/>
+      <dgm:spPr>
+        <a:scene3d>
+          <a:camera prst="orthographicFront"/>
+          <a:lightRig rig="chilly" dir="t"/>
+        </a:scene3d>
+        <a:sp3d z="-12700" extrusionH="1700" prstMaterial="dkEdge"/>
+      </dgm:spPr>
       <dgm:t>
         <a:bodyPr/>
         <a:lstStyle/>
@@ -1391,7 +1469,13 @@
     </dgm:pt>
     <dgm:pt modelId="{9A40CDA1-93D6-4B39-AFDE-59994BC4A20A}">
       <dgm:prSet phldrT="[Text]"/>
-      <dgm:spPr/>
+      <dgm:spPr>
+        <a:scene3d>
+          <a:camera prst="orthographicFront"/>
+          <a:lightRig rig="chilly" dir="t"/>
+        </a:scene3d>
+        <a:sp3d z="-12700" extrusionH="1700" prstMaterial="dkEdge"/>
+      </dgm:spPr>
       <dgm:t>
         <a:bodyPr/>
         <a:lstStyle/>
@@ -1427,7 +1511,13 @@
     </dgm:pt>
     <dgm:pt modelId="{62023EE6-2EB0-4515-9E7A-8696516D0AA2}">
       <dgm:prSet phldrT="[Text]"/>
-      <dgm:spPr/>
+      <dgm:spPr>
+        <a:scene3d>
+          <a:camera prst="orthographicFront"/>
+          <a:lightRig rig="chilly" dir="t"/>
+        </a:scene3d>
+        <a:sp3d z="-12700" extrusionH="1700" prstMaterial="dkEdge"/>
+      </dgm:spPr>
       <dgm:t>
         <a:bodyPr/>
         <a:lstStyle/>
@@ -1463,7 +1553,13 @@
     </dgm:pt>
     <dgm:pt modelId="{0408941E-D165-41C5-AC65-D447EFD3C6EF}">
       <dgm:prSet/>
-      <dgm:spPr/>
+      <dgm:spPr>
+        <a:scene3d>
+          <a:camera prst="orthographicFront"/>
+          <a:lightRig rig="chilly" dir="t"/>
+        </a:scene3d>
+        <a:sp3d z="-12700" extrusionH="1700" prstMaterial="dkEdge"/>
+      </dgm:spPr>
       <dgm:t>
         <a:bodyPr/>
         <a:lstStyle/>
@@ -1500,7 +1596,13 @@
     </dgm:pt>
     <dgm:pt modelId="{DB9A190E-C739-4E9C-AFD0-6884B4C6D4BE}">
       <dgm:prSet/>
-      <dgm:spPr/>
+      <dgm:spPr>
+        <a:scene3d>
+          <a:camera prst="orthographicFront"/>
+          <a:lightRig rig="chilly" dir="t"/>
+        </a:scene3d>
+        <a:sp3d z="-12700" extrusionH="1700" prstMaterial="dkEdge"/>
+      </dgm:spPr>
       <dgm:t>
         <a:bodyPr/>
         <a:lstStyle/>
@@ -1537,7 +1639,13 @@
     </dgm:pt>
     <dgm:pt modelId="{B0D74C06-BF11-439A-BEA0-F01A4F987141}">
       <dgm:prSet phldrT="[Text]"/>
-      <dgm:spPr/>
+      <dgm:spPr>
+        <a:scene3d>
+          <a:camera prst="orthographicFront"/>
+          <a:lightRig rig="chilly" dir="t"/>
+        </a:scene3d>
+        <a:sp3d z="-12700" extrusionH="1700" prstMaterial="dkEdge"/>
+      </dgm:spPr>
       <dgm:t>
         <a:bodyPr/>
         <a:lstStyle/>
@@ -1574,7 +1682,13 @@
     </dgm:pt>
     <dgm:pt modelId="{2CDFE76B-52EE-4206-BE33-7583B7E9E46A}">
       <dgm:prSet phldrT="[Text]"/>
-      <dgm:spPr/>
+      <dgm:spPr>
+        <a:scene3d>
+          <a:camera prst="orthographicFront"/>
+          <a:lightRig rig="chilly" dir="t"/>
+        </a:scene3d>
+        <a:sp3d z="-12700" extrusionH="1700" prstMaterial="dkEdge"/>
+      </dgm:spPr>
       <dgm:t>
         <a:bodyPr/>
         <a:lstStyle/>
@@ -1611,7 +1725,13 @@
     </dgm:pt>
     <dgm:pt modelId="{39AAA6ED-8161-44C1-A820-526CA374D096}">
       <dgm:prSet phldrT="[Text]"/>
-      <dgm:spPr/>
+      <dgm:spPr>
+        <a:scene3d>
+          <a:camera prst="orthographicFront"/>
+          <a:lightRig rig="chilly" dir="t"/>
+        </a:scene3d>
+        <a:sp3d z="-12700" extrusionH="1700" prstMaterial="dkEdge"/>
+      </dgm:spPr>
       <dgm:t>
         <a:bodyPr/>
         <a:lstStyle/>
@@ -1647,7 +1767,13 @@
     </dgm:pt>
     <dgm:pt modelId="{FA38A9D1-7FC0-44B3-9381-00D537912273}">
       <dgm:prSet phldrT="[Text]"/>
-      <dgm:spPr/>
+      <dgm:spPr>
+        <a:scene3d>
+          <a:camera prst="orthographicFront"/>
+          <a:lightRig rig="chilly" dir="t"/>
+        </a:scene3d>
+        <a:sp3d z="-12700" extrusionH="1700" prstMaterial="dkEdge"/>
+      </dgm:spPr>
       <dgm:t>
         <a:bodyPr/>
         <a:lstStyle/>
@@ -1683,7 +1809,13 @@
     </dgm:pt>
     <dgm:pt modelId="{9E958D2E-52AC-45E4-B969-6D42763B504D}">
       <dgm:prSet phldrT="[Text]"/>
-      <dgm:spPr/>
+      <dgm:spPr>
+        <a:scene3d>
+          <a:camera prst="orthographicFront"/>
+          <a:lightRig rig="chilly" dir="t"/>
+        </a:scene3d>
+        <a:sp3d z="-12700" extrusionH="1700" prstMaterial="dkEdge"/>
+      </dgm:spPr>
       <dgm:t>
         <a:bodyPr/>
         <a:lstStyle/>
@@ -1719,7 +1851,13 @@
     </dgm:pt>
     <dgm:pt modelId="{F0F6784B-FB6D-44BD-A834-E489FAA38B96}">
       <dgm:prSet phldrT="[Text]"/>
-      <dgm:spPr/>
+      <dgm:spPr>
+        <a:scene3d>
+          <a:camera prst="orthographicFront"/>
+          <a:lightRig rig="chilly" dir="t"/>
+        </a:scene3d>
+        <a:sp3d z="-12700" extrusionH="1700" prstMaterial="dkEdge"/>
+      </dgm:spPr>
       <dgm:t>
         <a:bodyPr/>
         <a:lstStyle/>
@@ -1827,7 +1965,13 @@
     </dgm:pt>
     <dgm:pt modelId="{19F08758-F7DF-4ED1-AC70-5C52C12D6695}">
       <dgm:prSet phldrT="[Text]"/>
-      <dgm:spPr/>
+      <dgm:spPr>
+        <a:scene3d>
+          <a:camera prst="orthographicFront"/>
+          <a:lightRig rig="chilly" dir="t"/>
+        </a:scene3d>
+        <a:sp3d z="-12700" extrusionH="1700" prstMaterial="dkEdge"/>
+      </dgm:spPr>
       <dgm:t>
         <a:bodyPr/>
         <a:lstStyle/>
@@ -1864,7 +2008,13 @@
     </dgm:pt>
     <dgm:pt modelId="{638E7C35-6FE1-4EBD-82DC-DBD1E7C579FD}">
       <dgm:prSet phldrT="[Text]"/>
-      <dgm:spPr/>
+      <dgm:spPr>
+        <a:scene3d>
+          <a:camera prst="orthographicFront"/>
+          <a:lightRig rig="chilly" dir="t"/>
+        </a:scene3d>
+        <a:sp3d z="-12700" extrusionH="1700" prstMaterial="dkEdge"/>
+      </dgm:spPr>
       <dgm:t>
         <a:bodyPr/>
         <a:lstStyle/>
@@ -1900,7 +2050,13 @@
     </dgm:pt>
     <dgm:pt modelId="{A83138B3-796F-4E30-A322-548DAFE8F79D}">
       <dgm:prSet phldrT="[Text]"/>
-      <dgm:spPr/>
+      <dgm:spPr>
+        <a:scene3d>
+          <a:camera prst="orthographicFront"/>
+          <a:lightRig rig="chilly" dir="t"/>
+        </a:scene3d>
+        <a:sp3d z="-12700" extrusionH="1700" prstMaterial="dkEdge"/>
+      </dgm:spPr>
       <dgm:t>
         <a:bodyPr/>
         <a:lstStyle/>
@@ -1937,7 +2093,13 @@
     </dgm:pt>
     <dgm:pt modelId="{4B31C88D-94CD-4D47-8A25-A18DCEE69884}">
       <dgm:prSet/>
-      <dgm:spPr/>
+      <dgm:spPr>
+        <a:scene3d>
+          <a:camera prst="orthographicFront"/>
+          <a:lightRig rig="chilly" dir="t"/>
+        </a:scene3d>
+        <a:sp3d z="-12700" extrusionH="1700" prstMaterial="dkEdge"/>
+      </dgm:spPr>
       <dgm:t>
         <a:bodyPr/>
         <a:lstStyle/>
@@ -2001,7 +2163,11 @@
     </dgm:pt>
     <dgm:pt modelId="{9C8A6CC0-B4A4-41EA-B298-3B5AE3E31B6A}" type="pres">
       <dgm:prSet presAssocID="{F59A9172-09D6-4C9E-BC24-30C1530FD2C4}" presName="rootText" presStyleLbl="node1" presStyleIdx="0" presStyleCnt="4"/>
-      <dgm:spPr/>
+      <dgm:spPr>
+        <a:prstGeom prst="rect">
+          <a:avLst/>
+        </a:prstGeom>
+      </dgm:spPr>
       <dgm:t>
         <a:bodyPr/>
         <a:lstStyle/>
@@ -2042,7 +2208,11 @@
           <dgm:bulletEnabled val="1"/>
         </dgm:presLayoutVars>
       </dgm:prSet>
-      <dgm:spPr/>
+      <dgm:spPr>
+        <a:prstGeom prst="rect">
+          <a:avLst/>
+        </a:prstGeom>
+      </dgm:spPr>
       <dgm:t>
         <a:bodyPr/>
         <a:lstStyle/>
@@ -2063,12 +2233,16 @@
       </dgm:t>
     </dgm:pt>
     <dgm:pt modelId="{FE0AD489-7ACE-415A-98CA-0F76B624C80F}" type="pres">
-      <dgm:prSet presAssocID="{4A7249EE-B677-41B7-9AAA-20616BCDA6B8}" presName="childText" presStyleLbl="bgAcc1" presStyleIdx="1" presStyleCnt="8">
+      <dgm:prSet presAssocID="{4A7249EE-B677-41B7-9AAA-20616BCDA6B8}" presName="childText" presStyleLbl="bgAcc1" presStyleIdx="1" presStyleCnt="8" custLinFactNeighborX="2654" custLinFactNeighborY="-7644">
         <dgm:presLayoutVars>
           <dgm:bulletEnabled val="1"/>
         </dgm:presLayoutVars>
       </dgm:prSet>
-      <dgm:spPr/>
+      <dgm:spPr>
+        <a:prstGeom prst="rect">
+          <a:avLst/>
+        </a:prstGeom>
+      </dgm:spPr>
       <dgm:t>
         <a:bodyPr/>
         <a:lstStyle/>
@@ -2094,7 +2268,11 @@
           <dgm:bulletEnabled val="1"/>
         </dgm:presLayoutVars>
       </dgm:prSet>
-      <dgm:spPr/>
+      <dgm:spPr>
+        <a:prstGeom prst="rect">
+          <a:avLst/>
+        </a:prstGeom>
+      </dgm:spPr>
       <dgm:t>
         <a:bodyPr/>
         <a:lstStyle/>
@@ -2113,7 +2291,11 @@
     </dgm:pt>
     <dgm:pt modelId="{8D87D78E-1014-4813-A0AA-399906529B1B}" type="pres">
       <dgm:prSet presAssocID="{8C6BCDEC-DD31-478A-A2E6-A43E8C76D5AA}" presName="rootText" presStyleLbl="node1" presStyleIdx="1" presStyleCnt="4"/>
-      <dgm:spPr/>
+      <dgm:spPr>
+        <a:prstGeom prst="rect">
+          <a:avLst/>
+        </a:prstGeom>
+      </dgm:spPr>
       <dgm:t>
         <a:bodyPr/>
         <a:lstStyle/>
@@ -2154,7 +2336,11 @@
           <dgm:bulletEnabled val="1"/>
         </dgm:presLayoutVars>
       </dgm:prSet>
-      <dgm:spPr/>
+      <dgm:spPr>
+        <a:prstGeom prst="rect">
+          <a:avLst/>
+        </a:prstGeom>
+      </dgm:spPr>
       <dgm:t>
         <a:bodyPr/>
         <a:lstStyle/>
@@ -2180,7 +2366,11 @@
           <dgm:bulletEnabled val="1"/>
         </dgm:presLayoutVars>
       </dgm:prSet>
-      <dgm:spPr/>
+      <dgm:spPr>
+        <a:prstGeom prst="rect">
+          <a:avLst/>
+        </a:prstGeom>
+      </dgm:spPr>
       <dgm:t>
         <a:bodyPr/>
         <a:lstStyle/>
@@ -2199,7 +2389,11 @@
     </dgm:pt>
     <dgm:pt modelId="{49268C43-18BA-4338-ABF0-FC4F83AE9761}" type="pres">
       <dgm:prSet presAssocID="{926090DC-122C-4287-8502-5EE2BD5D754D}" presName="rootText" presStyleLbl="node1" presStyleIdx="2" presStyleCnt="4"/>
-      <dgm:spPr/>
+      <dgm:spPr>
+        <a:prstGeom prst="rect">
+          <a:avLst/>
+        </a:prstGeom>
+      </dgm:spPr>
       <dgm:t>
         <a:bodyPr/>
         <a:lstStyle/>
@@ -2240,7 +2434,11 @@
           <dgm:bulletEnabled val="1"/>
         </dgm:presLayoutVars>
       </dgm:prSet>
-      <dgm:spPr/>
+      <dgm:spPr>
+        <a:prstGeom prst="rect">
+          <a:avLst/>
+        </a:prstGeom>
+      </dgm:spPr>
       <dgm:t>
         <a:bodyPr/>
         <a:lstStyle/>
@@ -2259,7 +2457,11 @@
     </dgm:pt>
     <dgm:pt modelId="{9DFBB1A3-F5EB-4DC2-A838-4D8325CAA723}" type="pres">
       <dgm:prSet presAssocID="{19F22B93-FE62-4406-A620-6D7A8D41A868}" presName="rootText" presStyleLbl="node1" presStyleIdx="3" presStyleCnt="4"/>
-      <dgm:spPr/>
+      <dgm:spPr>
+        <a:prstGeom prst="rect">
+          <a:avLst/>
+        </a:prstGeom>
+      </dgm:spPr>
       <dgm:t>
         <a:bodyPr/>
         <a:lstStyle/>
@@ -2300,7 +2502,11 @@
           <dgm:bulletEnabled val="1"/>
         </dgm:presLayoutVars>
       </dgm:prSet>
-      <dgm:spPr/>
+      <dgm:spPr>
+        <a:prstGeom prst="rect">
+          <a:avLst/>
+        </a:prstGeom>
+      </dgm:spPr>
       <dgm:t>
         <a:bodyPr/>
         <a:lstStyle/>
@@ -2326,7 +2532,11 @@
           <dgm:bulletEnabled val="1"/>
         </dgm:presLayoutVars>
       </dgm:prSet>
-      <dgm:spPr/>
+      <dgm:spPr>
+        <a:prstGeom prst="rect">
+          <a:avLst/>
+        </a:prstGeom>
+      </dgm:spPr>
       <dgm:t>
         <a:bodyPr/>
         <a:lstStyle/>
@@ -2451,7 +2661,7 @@
   <dgm:whole/>
   <dgm:extLst>
     <a:ext uri="http://schemas.microsoft.com/office/drawing/2008/diagram">
-      <dsp:dataModelExt xmlns="" xmlns:dsp="http://schemas.microsoft.com/office/drawing/2008/diagram" relId="rId6" minVer="http://schemas.openxmlformats.org/drawingml/2006/diagram"/>
+      <dsp:dataModelExt xmlns:dsp="http://schemas.microsoft.com/office/drawing/2008/diagram" xmlns="" relId="rId6" minVer="http://schemas.openxmlformats.org/drawingml/2006/diagram"/>
     </a:ext>
   </dgm:extLst>
 </dgm:dataModel>
@@ -9077,7 +9287,7 @@
           <p:nvPr>
             <p:extLst>
               <p:ext uri="{D42A27DB-BD31-4B8C-83A1-F6EECF244321}">
-                <p14:modId xmlns="" xmlns:p14="http://schemas.microsoft.com/office/powerpoint/2010/main" val="841392489"/>
+                <p14:modId xmlns:p14="http://schemas.microsoft.com/office/powerpoint/2010/main" xmlns="" val="841392489"/>
               </p:ext>
             </p:extLst>
           </p:nvPr>

</xml_diff>